<commit_message>
added eignung to backup file
</commit_message>
<xml_diff>
--- a/Z-Wave_Presentation_backup.pptx
+++ b/Z-Wave_Presentation_backup.pptx
@@ -214,7 +214,7 @@
           <a:p>
             <a:fld id="{AB35F272-415F-4538-B4CE-9FA364691D96}" type="datetimeFigureOut">
               <a:rPr lang="de-CH" smtClean="0"/>
-              <a:t>10.03.2016</a:t>
+              <a:t>13.03.2016</a:t>
             </a:fld>
             <a:endParaRPr lang="de-CH"/>
           </a:p>
@@ -813,7 +813,7 @@
           <a:p>
             <a:fld id="{385DF268-AEF6-46C5-8D9C-EB18CF741AF6}" type="datetimeFigureOut">
               <a:rPr lang="de-CH" smtClean="0"/>
-              <a:t>10.03.2016</a:t>
+              <a:t>13.03.2016</a:t>
             </a:fld>
             <a:endParaRPr lang="de-CH"/>
           </a:p>
@@ -990,7 +990,7 @@
           <a:p>
             <a:fld id="{385DF268-AEF6-46C5-8D9C-EB18CF741AF6}" type="datetimeFigureOut">
               <a:rPr lang="de-CH" smtClean="0"/>
-              <a:t>10.03.2016</a:t>
+              <a:t>13.03.2016</a:t>
             </a:fld>
             <a:endParaRPr lang="de-CH"/>
           </a:p>
@@ -1170,7 +1170,7 @@
           <a:p>
             <a:fld id="{385DF268-AEF6-46C5-8D9C-EB18CF741AF6}" type="datetimeFigureOut">
               <a:rPr lang="de-CH" smtClean="0"/>
-              <a:t>10.03.2016</a:t>
+              <a:t>13.03.2016</a:t>
             </a:fld>
             <a:endParaRPr lang="de-CH"/>
           </a:p>
@@ -1350,7 +1350,7 @@
           <a:p>
             <a:fld id="{385DF268-AEF6-46C5-8D9C-EB18CF741AF6}" type="datetimeFigureOut">
               <a:rPr lang="de-CH" smtClean="0"/>
-              <a:t>10.03.2016</a:t>
+              <a:t>13.03.2016</a:t>
             </a:fld>
             <a:endParaRPr lang="de-CH"/>
           </a:p>
@@ -1675,7 +1675,7 @@
           <a:p>
             <a:fld id="{385DF268-AEF6-46C5-8D9C-EB18CF741AF6}" type="datetimeFigureOut">
               <a:rPr lang="de-CH" smtClean="0"/>
-              <a:t>10.03.2016</a:t>
+              <a:t>13.03.2016</a:t>
             </a:fld>
             <a:endParaRPr lang="de-CH"/>
           </a:p>
@@ -1907,7 +1907,7 @@
           <a:p>
             <a:fld id="{385DF268-AEF6-46C5-8D9C-EB18CF741AF6}" type="datetimeFigureOut">
               <a:rPr lang="de-CH" smtClean="0"/>
-              <a:t>10.03.2016</a:t>
+              <a:t>13.03.2016</a:t>
             </a:fld>
             <a:endParaRPr lang="de-CH"/>
           </a:p>
@@ -2266,7 +2266,7 @@
           <a:p>
             <a:fld id="{385DF268-AEF6-46C5-8D9C-EB18CF741AF6}" type="datetimeFigureOut">
               <a:rPr lang="de-CH" smtClean="0"/>
-              <a:t>10.03.2016</a:t>
+              <a:t>13.03.2016</a:t>
             </a:fld>
             <a:endParaRPr lang="de-CH"/>
           </a:p>
@@ -2407,7 +2407,7 @@
           <a:p>
             <a:fld id="{385DF268-AEF6-46C5-8D9C-EB18CF741AF6}" type="datetimeFigureOut">
               <a:rPr lang="de-CH" smtClean="0"/>
-              <a:t>10.03.2016</a:t>
+              <a:t>13.03.2016</a:t>
             </a:fld>
             <a:endParaRPr lang="de-CH"/>
           </a:p>
@@ -2502,7 +2502,7 @@
           <a:p>
             <a:fld id="{385DF268-AEF6-46C5-8D9C-EB18CF741AF6}" type="datetimeFigureOut">
               <a:rPr lang="de-CH" smtClean="0"/>
-              <a:t>10.03.2016</a:t>
+              <a:t>13.03.2016</a:t>
             </a:fld>
             <a:endParaRPr lang="de-CH"/>
           </a:p>
@@ -2859,7 +2859,7 @@
           <a:p>
             <a:fld id="{385DF268-AEF6-46C5-8D9C-EB18CF741AF6}" type="datetimeFigureOut">
               <a:rPr lang="de-CH" smtClean="0"/>
-              <a:t>10.03.2016</a:t>
+              <a:t>13.03.2016</a:t>
             </a:fld>
             <a:endParaRPr lang="de-CH"/>
           </a:p>
@@ -3216,7 +3216,7 @@
           <a:p>
             <a:fld id="{385DF268-AEF6-46C5-8D9C-EB18CF741AF6}" type="datetimeFigureOut">
               <a:rPr lang="de-CH" smtClean="0"/>
-              <a:t>10.03.2016</a:t>
+              <a:t>13.03.2016</a:t>
             </a:fld>
             <a:endParaRPr lang="de-CH"/>
           </a:p>
@@ -3457,7 +3457,7 @@
           <a:p>
             <a:fld id="{385DF268-AEF6-46C5-8D9C-EB18CF741AF6}" type="datetimeFigureOut">
               <a:rPr lang="de-CH" smtClean="0"/>
-              <a:t>10.03.2016</a:t>
+              <a:t>13.03.2016</a:t>
             </a:fld>
             <a:endParaRPr lang="de-CH"/>
           </a:p>
@@ -9240,10 +9240,78 @@
           <a:bodyPr/>
           <a:lstStyle/>
           <a:p>
+            <a:r>
+              <a:rPr lang="de-CH" dirty="0"/>
+              <a:t>Energieverbrauch: </a:t>
+            </a:r>
+            <a:r>
+              <a:rPr lang="de-CH" dirty="0" smtClean="0"/>
+              <a:t>	power-safe </a:t>
+            </a:r>
+            <a:r>
+              <a:rPr lang="de-CH" dirty="0"/>
+              <a:t>Mode </a:t>
+            </a:r>
+            <a:br>
+              <a:rPr lang="de-CH" dirty="0"/>
+            </a:br>
+            <a:r>
+              <a:rPr lang="de-CH" dirty="0"/>
+              <a:t>Eignungsbereiche: </a:t>
+            </a:r>
+            <a:r>
+              <a:rPr lang="de-CH" dirty="0" smtClean="0"/>
+              <a:t>	SmartHome </a:t>
+            </a:r>
+            <a:r>
+              <a:rPr lang="de-CH" dirty="0"/>
+              <a:t/>
+            </a:r>
+            <a:br>
+              <a:rPr lang="de-CH" dirty="0"/>
+            </a:br>
+            <a:r>
+              <a:rPr lang="de-CH" dirty="0"/>
+              <a:t>Entwicklung: </a:t>
+            </a:r>
+            <a:r>
+              <a:rPr lang="de-CH" dirty="0" smtClean="0"/>
+              <a:t>		OpenZWave </a:t>
+            </a:r>
             <a:endParaRPr lang="de-CH" dirty="0"/>
           </a:p>
         </p:txBody>
       </p:sp>
+      <p:pic>
+        <p:nvPicPr>
+          <p:cNvPr id="4" name="Picture 3"/>
+          <p:cNvPicPr>
+            <a:picLocks noChangeAspect="1"/>
+          </p:cNvPicPr>
+          <p:nvPr/>
+        </p:nvPicPr>
+        <p:blipFill>
+          <a:blip r:embed="rId2">
+            <a:extLst>
+              <a:ext uri="{28A0092B-C50C-407E-A947-70E740481C1C}">
+                <a14:useLocalDpi xmlns:a14="http://schemas.microsoft.com/office/drawing/2010/main" val="0"/>
+              </a:ext>
+            </a:extLst>
+          </a:blip>
+          <a:stretch>
+            <a:fillRect/>
+          </a:stretch>
+        </p:blipFill>
+        <p:spPr>
+          <a:xfrm>
+            <a:off x="4953143" y="3835686"/>
+            <a:ext cx="2285714" cy="1142857"/>
+          </a:xfrm>
+          <a:prstGeom prst="rect">
+            <a:avLst/>
+          </a:prstGeom>
+        </p:spPr>
+      </p:pic>
     </p:spTree>
     <p:extLst>
       <p:ext uri="{BB962C8B-B14F-4D97-AF65-F5344CB8AC3E}">
@@ -9427,11 +9495,7 @@
           <a:p>
             <a:r>
               <a:rPr lang="de-CH" dirty="0" smtClean="0"/>
-              <a:t>Demo Z-Wave </a:t>
-            </a:r>
-            <a:r>
-              <a:rPr lang="de-CH" dirty="0" smtClean="0"/>
-              <a:t>Prinzip</a:t>
+              <a:t>Demo Z-Wave Prinzip</a:t>
             </a:r>
           </a:p>
           <a:p>
@@ -9439,7 +9503,6 @@
               <a:rPr lang="de-CH" dirty="0" smtClean="0"/>
               <a:t>Generell</a:t>
             </a:r>
-            <a:endParaRPr lang="de-CH" dirty="0" smtClean="0"/>
           </a:p>
           <a:p>
             <a:r>
@@ -9500,7 +9563,6 @@
               <a:rPr lang="de-CH" dirty="0" smtClean="0"/>
               <a:t>Quellen &amp; Fragen</a:t>
             </a:r>
-            <a:endParaRPr lang="de-CH" dirty="0" smtClean="0"/>
           </a:p>
           <a:p>
             <a:endParaRPr lang="de-CH" dirty="0" smtClean="0"/>

</xml_diff>